<commit_message>
Fixed links to github repo
</commit_message>
<xml_diff>
--- a/GamePhysics-en.pptx
+++ b/GamePhysics-en.pptx
@@ -337,7 +337,7 @@
             <a:fld id="{451DEABC-D766-4322-8E78-B830FAE35C72}" type="datetime4">
               <a:rPr lang="en-US" smtClean="0"/>
               <a:pPr/>
-              <a:t>June 5, 2014</a:t>
+              <a:t>June 25, 2014</a:t>
             </a:fld>
             <a:endParaRPr lang="en-US" dirty="0"/>
           </a:p>
@@ -604,7 +604,7 @@
             <a:fld id="{F3131F9E-604E-4343-9F29-EF72E8231CAD}" type="datetime4">
               <a:rPr lang="en-US" smtClean="0"/>
               <a:pPr/>
-              <a:t>June 5, 2014</a:t>
+              <a:t>June 25, 2014</a:t>
             </a:fld>
             <a:endParaRPr lang="en-US"/>
           </a:p>
@@ -781,7 +781,7 @@
             <a:fld id="{34A8E1CE-37F8-4102-8DF9-852A0A51F293}" type="datetime4">
               <a:rPr lang="en-US" smtClean="0"/>
               <a:pPr/>
-              <a:t>June 5, 2014</a:t>
+              <a:t>June 25, 2014</a:t>
             </a:fld>
             <a:endParaRPr lang="en-US"/>
           </a:p>
@@ -948,7 +948,7 @@
             <a:fld id="{93333F43-3E86-47E4-BFBB-2476D384E1C6}" type="datetime4">
               <a:rPr lang="en-US" smtClean="0"/>
               <a:pPr/>
-              <a:t>June 5, 2014</a:t>
+              <a:t>June 25, 2014</a:t>
             </a:fld>
             <a:endParaRPr lang="en-US"/>
           </a:p>
@@ -1199,7 +1199,7 @@
             <a:fld id="{751663BA-01FC-4367-B6F3-ABB2645D55F1}" type="datetime4">
               <a:rPr lang="en-US" smtClean="0"/>
               <a:pPr/>
-              <a:t>June 5, 2014</a:t>
+              <a:t>June 25, 2014</a:t>
             </a:fld>
             <a:endParaRPr lang="en-US" dirty="0"/>
           </a:p>
@@ -1484,7 +1484,7 @@
             <a:fld id="{79B19C71-EC74-44AF-B27E-FC7DC3C3A61D}" type="datetime4">
               <a:rPr lang="en-US" smtClean="0"/>
               <a:pPr/>
-              <a:t>June 5, 2014</a:t>
+              <a:t>June 25, 2014</a:t>
             </a:fld>
             <a:endParaRPr lang="en-US"/>
           </a:p>
@@ -1925,7 +1925,7 @@
             <a:fld id="{6A5CDA29-3CBE-48EA-92AE-A996835462BA}" type="datetime4">
               <a:rPr lang="en-US" smtClean="0"/>
               <a:pPr/>
-              <a:t>June 5, 2014</a:t>
+              <a:t>June 25, 2014</a:t>
             </a:fld>
             <a:endParaRPr lang="en-US"/>
           </a:p>
@@ -2040,7 +2040,7 @@
             <a:fld id="{E29EC054-3869-4501-B163-1BBFDE8DCE04}" type="datetime4">
               <a:rPr lang="en-US" smtClean="0"/>
               <a:pPr/>
-              <a:t>June 5, 2014</a:t>
+              <a:t>June 25, 2014</a:t>
             </a:fld>
             <a:endParaRPr lang="en-US"/>
           </a:p>
@@ -2132,7 +2132,7 @@
             <a:fld id="{0A63D831-56C1-49CF-8EF7-8B9A98402BCD}" type="datetime4">
               <a:rPr lang="en-US" smtClean="0"/>
               <a:pPr/>
-              <a:t>June 5, 2014</a:t>
+              <a:t>June 25, 2014</a:t>
             </a:fld>
             <a:endParaRPr lang="en-US"/>
           </a:p>
@@ -2376,7 +2376,7 @@
             <a:fld id="{6EAD5615-7F4F-4584-84D5-CC95918C321F}" type="datetime4">
               <a:rPr lang="en-US" smtClean="0"/>
               <a:pPr/>
-              <a:t>June 5, 2014</a:t>
+              <a:t>June 25, 2014</a:t>
             </a:fld>
             <a:endParaRPr lang="en-US"/>
           </a:p>
@@ -2672,7 +2672,7 @@
             <a:fld id="{76EEA923-9BEE-48CE-9F28-5B525F399BAD}" type="datetime4">
               <a:rPr lang="en-US" smtClean="0"/>
               <a:pPr/>
-              <a:t>June 5, 2014</a:t>
+              <a:t>June 25, 2014</a:t>
             </a:fld>
             <a:endParaRPr lang="en-US"/>
           </a:p>
@@ -2968,7 +2968,7 @@
             <a:fld id="{17D0EFEE-2756-4A20-BF2A-63F0A94F99AC}" type="datetime4">
               <a:rPr lang="en-US" smtClean="0"/>
               <a:pPr/>
-              <a:t>June 5, 2014</a:t>
+              <a:t>June 25, 2014</a:t>
             </a:fld>
             <a:endParaRPr lang="en-US" dirty="0"/>
           </a:p>
@@ -3480,20 +3480,12 @@
               <a:rPr lang="en-US" sz="4000" dirty="0" smtClean="0"/>
               <a:t>Game physics</a:t>
             </a:r>
-            <a:r>
-              <a:rPr lang="en-US" sz="4000" dirty="0" smtClean="0"/>
-              <a:t/>
-            </a:r>
             <a:br>
               <a:rPr lang="en-US" sz="4000" dirty="0" smtClean="0"/>
             </a:br>
             <a:r>
               <a:rPr lang="en-US" sz="4000" dirty="0" smtClean="0"/>
               <a:t>in</a:t>
-            </a:r>
-            <a:r>
-              <a:rPr lang="en-US" sz="4000" dirty="0" smtClean="0"/>
-              <a:t/>
             </a:r>
             <a:br>
               <a:rPr lang="en-US" sz="4000" dirty="0" smtClean="0"/>
@@ -3862,24 +3854,12 @@
               <a:rPr lang="en-US" dirty="0" smtClean="0"/>
               <a:t>Gravitation in</a:t>
             </a:r>
-            <a:r>
-              <a:rPr lang="en-US" dirty="0" smtClean="0"/>
-              <a:t/>
-            </a:r>
             <a:br>
               <a:rPr lang="en-US" dirty="0" smtClean="0"/>
             </a:br>
             <a:r>
               <a:rPr lang="en-US" dirty="0" smtClean="0"/>
-              <a:t>P2.js </a:t>
-            </a:r>
-            <a:r>
-              <a:rPr lang="en-US" dirty="0" smtClean="0"/>
-              <a:t>&amp; </a:t>
-            </a:r>
-            <a:r>
-              <a:rPr lang="en-US" dirty="0" smtClean="0"/>
-              <a:t>physics.js</a:t>
+              <a:t>P2.js &amp; physics.js</a:t>
             </a:r>
             <a:endParaRPr lang="en-US" dirty="0"/>
           </a:p>
@@ -4117,15 +4097,7 @@
             </a:br>
             <a:r>
               <a:rPr lang="en-US" dirty="0" smtClean="0"/>
-              <a:t>p2.js </a:t>
-            </a:r>
-            <a:r>
-              <a:rPr lang="en-US" dirty="0" smtClean="0"/>
-              <a:t>&amp; </a:t>
-            </a:r>
-            <a:r>
-              <a:rPr lang="en-US" dirty="0" smtClean="0"/>
-              <a:t>PHYSICS.JS</a:t>
+              <a:t>p2.js &amp; PHYSICS.JS</a:t>
             </a:r>
             <a:endParaRPr lang="en-US" dirty="0"/>
           </a:p>
@@ -4165,13 +4137,6 @@
               </a:rPr>
               <a:t>comes for free</a:t>
             </a:r>
-            <a:endParaRPr lang="en-US" sz="3200" dirty="0" smtClean="0">
-              <a:solidFill>
-                <a:schemeClr val="tx2">
-                  <a:lumMod val="75000"/>
-                </a:schemeClr>
-              </a:solidFill>
-            </a:endParaRPr>
           </a:p>
           <a:p>
             <a:r>
@@ -6048,24 +6013,12 @@
               <a:rPr lang="en-US" dirty="0" smtClean="0"/>
               <a:t>Joints/constraints in</a:t>
             </a:r>
-            <a:r>
-              <a:rPr lang="en-US" dirty="0" smtClean="0"/>
-              <a:t/>
-            </a:r>
             <a:br>
               <a:rPr lang="en-US" dirty="0" smtClean="0"/>
             </a:br>
             <a:r>
               <a:rPr lang="en-US" dirty="0" smtClean="0"/>
-              <a:t>p2.js </a:t>
-            </a:r>
-            <a:r>
-              <a:rPr lang="en-US" dirty="0" smtClean="0"/>
-              <a:t>&amp; </a:t>
-            </a:r>
-            <a:r>
-              <a:rPr lang="en-US" dirty="0" smtClean="0"/>
-              <a:t>physics.js</a:t>
+              <a:t>p2.js &amp; physics.js</a:t>
             </a:r>
             <a:endParaRPr lang="en-US" dirty="0"/>
           </a:p>
@@ -6337,7 +6290,6 @@
               <a:rPr lang="en-US" sz="3200" dirty="0" smtClean="0"/>
               <a:t>World</a:t>
             </a:r>
-            <a:endParaRPr lang="en-US" sz="3200" dirty="0" smtClean="0"/>
           </a:p>
           <a:p>
             <a:pPr marL="342900" indent="-342900">
@@ -6348,7 +6300,6 @@
               <a:rPr lang="en-US" sz="3200" dirty="0" smtClean="0"/>
               <a:t>Bodies</a:t>
             </a:r>
-            <a:endParaRPr lang="en-US" sz="3200" dirty="0" smtClean="0"/>
           </a:p>
           <a:p>
             <a:pPr marL="342900" indent="-342900">
@@ -6359,7 +6310,6 @@
               <a:rPr lang="en-US" sz="3200" dirty="0" smtClean="0"/>
               <a:t>Interaction rules/behaviors</a:t>
             </a:r>
-            <a:endParaRPr lang="en-US" sz="3200" dirty="0" smtClean="0"/>
           </a:p>
           <a:p>
             <a:pPr marL="342900" indent="-342900">
@@ -6981,10 +6931,6 @@
               <a:rPr lang="ru-RU" dirty="0" smtClean="0"/>
               <a:t>. </a:t>
             </a:r>
-            <a:r>
-              <a:rPr lang="ru-RU" dirty="0" smtClean="0"/>
-              <a:t/>
-            </a:r>
             <a:br>
               <a:rPr lang="ru-RU" dirty="0" smtClean="0"/>
             </a:br>
@@ -7190,10 +7136,6 @@
               <a:rPr lang="ru-RU" dirty="0" smtClean="0"/>
               <a:t>.</a:t>
             </a:r>
-            <a:r>
-              <a:rPr lang="ru-RU" dirty="0" smtClean="0"/>
-              <a:t/>
-            </a:r>
             <a:br>
               <a:rPr lang="ru-RU" dirty="0" smtClean="0"/>
             </a:br>
@@ -7293,10 +7235,6 @@
               <a:rPr lang="en-US" sz="4400" dirty="0" smtClean="0"/>
               <a:t>Thank you!</a:t>
             </a:r>
-            <a:r>
-              <a:rPr lang="en-US" sz="4400" dirty="0" smtClean="0"/>
-              <a:t/>
-            </a:r>
             <a:br>
               <a:rPr lang="en-US" sz="4400" dirty="0" smtClean="0"/>
             </a:br>
@@ -7392,7 +7330,6 @@
               <a:rPr lang="en-US" sz="3200" dirty="0" smtClean="0"/>
               <a:t>Examples: </a:t>
             </a:r>
-            <a:endParaRPr lang="en-US" sz="3200" dirty="0" smtClean="0"/>
           </a:p>
           <a:p>
             <a:endParaRPr lang="en-US" sz="2800" dirty="0" smtClean="0"/>
@@ -7887,15 +7824,7 @@
             </a:br>
             <a:r>
               <a:rPr lang="en-US" dirty="0" smtClean="0"/>
-              <a:t>p2.js </a:t>
-            </a:r>
-            <a:r>
-              <a:rPr lang="en-US" dirty="0" smtClean="0"/>
-              <a:t>&amp; </a:t>
-            </a:r>
-            <a:r>
-              <a:rPr lang="en-US" dirty="0" smtClean="0"/>
-              <a:t>PHYSICS</a:t>
+              <a:t>p2.js &amp; PHYSICS</a:t>
             </a:r>
             <a:endParaRPr lang="en-US" dirty="0"/>
           </a:p>
@@ -7932,11 +7861,6 @@
               </a:rPr>
               <a:t>none</a:t>
             </a:r>
-            <a:endParaRPr lang="en-US" sz="2800" dirty="0" smtClean="0">
-              <a:solidFill>
-                <a:srgbClr val="9D1E23"/>
-              </a:solidFill>
-            </a:endParaRPr>
           </a:p>
           <a:p>
             <a:pPr marL="342900" indent="-342900">
@@ -8236,11 +8160,7 @@
             <a:pPr algn="ctr"/>
             <a:r>
               <a:rPr lang="en-US" dirty="0" smtClean="0"/>
-              <a:t>DEMO: </a:t>
-            </a:r>
-            <a:r>
-              <a:rPr lang="en-US" dirty="0" smtClean="0"/>
-              <a:t>HELLO WORLD</a:t>
+              <a:t>DEMO: HELLO WORLD</a:t>
             </a:r>
             <a:endParaRPr lang="en-US" dirty="0"/>
           </a:p>

</xml_diff>